<commit_message>
better version of app
</commit_message>
<xml_diff>
--- a/Документация/95_presentation.pptx
+++ b/Документация/95_presentation.pptx
@@ -20,21 +20,21 @@
   <p:notesSz cx="6858000" cy="9144000"/>
   <p:embeddedFontLst>
     <p:embeddedFont>
-      <p:font typeface="Poppins" panose="020B0604020202020204" charset="0"/>
+      <p:font typeface="Prompt SemiBold" panose="00000700000000000000" charset="-34"/>
       <p:regular r:id="rId10"/>
       <p:bold r:id="rId11"/>
       <p:italic r:id="rId12"/>
       <p:boldItalic r:id="rId13"/>
     </p:embeddedFont>
     <p:embeddedFont>
-      <p:font typeface="Prompt Medium" panose="00000600000000000000" charset="-34"/>
+      <p:font typeface="Poppins" panose="020B0604020202020204" charset="0"/>
       <p:regular r:id="rId14"/>
       <p:bold r:id="rId15"/>
       <p:italic r:id="rId16"/>
       <p:boldItalic r:id="rId17"/>
     </p:embeddedFont>
     <p:embeddedFont>
-      <p:font typeface="Prompt SemiBold" panose="00000700000000000000" charset="-34"/>
+      <p:font typeface="Prompt Medium" panose="00000600000000000000" charset="-34"/>
       <p:regular r:id="rId18"/>
       <p:bold r:id="rId19"/>
       <p:italic r:id="rId20"/>
@@ -28819,16 +28819,25 @@
                 </a:solidFill>
                 <a:latin typeface="+mn-lt"/>
               </a:rPr>
-              <a:t>Проект №</a:t>
+              <a:t>Проект </a:t>
             </a:r>
             <a:r>
-              <a:rPr lang="en-US" sz="3200" b="1" dirty="0">
+              <a:rPr lang="bg-BG" sz="3200" b="1" dirty="0" smtClean="0">
                 <a:solidFill>
                   <a:schemeClr val="accent6"/>
                 </a:solidFill>
                 <a:latin typeface="+mn-lt"/>
               </a:rPr>
-              <a:t>157</a:t>
+              <a:t>№</a:t>
+            </a:r>
+            <a:r>
+              <a:rPr lang="en-US" sz="3200" b="1" smtClean="0">
+                <a:solidFill>
+                  <a:schemeClr val="accent6"/>
+                </a:solidFill>
+                <a:latin typeface="+mn-lt"/>
+              </a:rPr>
+              <a:t>95</a:t>
             </a:r>
             <a:r>
               <a:rPr lang="bg-BG" sz="3200" b="1" dirty="0">

</xml_diff>

<commit_message>
change for all go on phone
</commit_message>
<xml_diff>
--- a/Документация/95_presentation.pptx
+++ b/Документация/95_presentation.pptx
@@ -28831,7 +28831,7 @@
               <a:t>№</a:t>
             </a:r>
             <a:r>
-              <a:rPr lang="en-US" sz="3200" b="1" smtClean="0">
+              <a:rPr lang="en-US" sz="3200" b="1" dirty="0" smtClean="0">
                 <a:solidFill>
                   <a:schemeClr val="accent6"/>
                 </a:solidFill>
@@ -30340,7 +30340,7 @@
         </p:blipFill>
         <p:spPr bwMode="auto">
           <a:xfrm>
-            <a:off x="6604732" y="1099280"/>
+            <a:off x="6604732" y="1530256"/>
             <a:ext cx="1753615" cy="2374810"/>
           </a:xfrm>
           <a:prstGeom prst="rect">
@@ -44618,8 +44618,8 @@
         </p:blipFill>
         <p:spPr>
           <a:xfrm>
-            <a:off x="5956300" y="2616942"/>
-            <a:ext cx="2216466" cy="1478799"/>
+            <a:off x="6176851" y="2731168"/>
+            <a:ext cx="2035819" cy="1358273"/>
           </a:xfrm>
           <a:prstGeom prst="rect">
             <a:avLst/>
@@ -49133,7 +49133,7 @@
 <file path=ppt/theme/theme1.xml><?xml version="1.0" encoding="utf-8"?>
 <a:theme xmlns:a="http://schemas.openxmlformats.org/drawingml/2006/main" name="Eye Donation Breakthrough by Slidesgo">
   <a:themeElements>
-    <a:clrScheme name="Simple Light">
+    <a:clrScheme name="Custom 2">
       <a:dk1>
         <a:srgbClr val="030854"/>
       </a:dk1>
@@ -49165,7 +49165,7 @@
         <a:srgbClr val="FFFFFF"/>
       </a:accent6>
       <a:hlink>
-        <a:srgbClr val="030854"/>
+        <a:srgbClr val="FFFFFF"/>
       </a:hlink>
       <a:folHlink>
         <a:srgbClr val="0097A7"/>

</xml_diff>